<commit_message>
add stuff to powerpoint
</commit_message>
<xml_diff>
--- a/docs/Aquasensor 2 slidedeck.pptx
+++ b/docs/Aquasensor 2 slidedeck.pptx
@@ -11,6 +11,8 @@
     <p:sldId id="256" r:id="rId4"/>
     <p:sldId id="257" r:id="rId5"/>
     <p:sldId id="258" r:id="rId6"/>
+    <p:sldId id="259" r:id="rId7"/>
+    <p:sldId id="260" r:id="rId8"/>
   </p:sldIdLst>
   <p:sldSz cx="12192000" cy="6858000"/>
   <p:notesSz cx="6858000" cy="9144000"/>
@@ -36,7 +38,7 @@
       </p:grpSpPr>
       <p:sp>
         <p:nvSpPr>
-          <p:cNvPr id="41" name="PlaceHolder 1"/>
+          <p:cNvPr id="38" name="PlaceHolder 1"/>
           <p:cNvSpPr>
             <a:spLocks noGrp="1"/>
           </p:cNvSpPr>
@@ -62,27 +64,24 @@
             <a:noAutofit/>
           </a:bodyPr>
           <a:p>
+            <a:pPr algn="ctr">
+              <a:buNone/>
+            </a:pPr>
             <a:r>
-              <a:rPr b="0" lang="en-US" sz="1800" spc="-1" strike="noStrike">
-                <a:solidFill>
-                  <a:srgbClr val="000000"/>
-                </a:solidFill>
-                <a:latin typeface="Neue Haas Grotesk Text Pro"/>
+              <a:rPr b="0" lang="en-GB" sz="4400" spc="-1" strike="noStrike">
+                <a:latin typeface="Arial"/>
               </a:rPr>
               <a:t>Click to move the slide</a:t>
             </a:r>
-            <a:endParaRPr b="0" lang="en-US" sz="1800" spc="-1" strike="noStrike">
-              <a:solidFill>
-                <a:srgbClr val="000000"/>
-              </a:solidFill>
-              <a:latin typeface="Neue Haas Grotesk Text Pro"/>
-            </a:endParaRPr>
-          </a:p>
-        </p:txBody>
-      </p:sp>
-      <p:sp>
-        <p:nvSpPr>
-          <p:cNvPr id="42" name="PlaceHolder 2"/>
+            <a:endParaRPr b="0" lang="en-GB" sz="4400" spc="-1" strike="noStrike">
+              <a:latin typeface="Arial"/>
+            </a:endParaRPr>
+          </a:p>
+        </p:txBody>
+      </p:sp>
+      <p:sp>
+        <p:nvSpPr>
+          <p:cNvPr id="39" name="PlaceHolder 2"/>
           <p:cNvSpPr>
             <a:spLocks noGrp="1"/>
           </p:cNvSpPr>
@@ -122,7 +121,7 @@
       </p:sp>
       <p:sp>
         <p:nvSpPr>
-          <p:cNvPr id="43" name="PlaceHolder 3"/>
+          <p:cNvPr id="40" name="PlaceHolder 3"/>
           <p:cNvSpPr>
             <a:spLocks noGrp="1"/>
           </p:cNvSpPr>
@@ -162,7 +161,7 @@
       </p:sp>
       <p:sp>
         <p:nvSpPr>
-          <p:cNvPr id="44" name="PlaceHolder 4"/>
+          <p:cNvPr id="41" name="PlaceHolder 4"/>
           <p:cNvSpPr>
             <a:spLocks noGrp="1"/>
           </p:cNvSpPr>
@@ -205,7 +204,7 @@
       </p:sp>
       <p:sp>
         <p:nvSpPr>
-          <p:cNvPr id="45" name="PlaceHolder 5"/>
+          <p:cNvPr id="42" name="PlaceHolder 5"/>
           <p:cNvSpPr>
             <a:spLocks noGrp="1"/>
           </p:cNvSpPr>
@@ -245,7 +244,7 @@
       </p:sp>
       <p:sp>
         <p:nvSpPr>
-          <p:cNvPr id="46" name="PlaceHolder 6"/>
+          <p:cNvPr id="43" name="PlaceHolder 6"/>
           <p:cNvSpPr>
             <a:spLocks noGrp="1"/>
           </p:cNvSpPr>
@@ -274,7 +273,7 @@
             <a:pPr algn="r">
               <a:buNone/>
             </a:pPr>
-            <a:fld id="{170D210D-61ED-4170-8343-9D14F690FF40}" type="slidenum">
+            <a:fld id="{7715BE2F-6759-4628-ABC8-FD1399B962E4}" type="slidenum">
               <a:rPr b="0" lang="en-GB" sz="1400" spc="-1" strike="noStrike">
                 <a:latin typeface="Times New Roman"/>
               </a:rPr>
@@ -311,7 +310,7 @@
       </p:grpSpPr>
       <p:sp>
         <p:nvSpPr>
-          <p:cNvPr id="60" name="PlaceHolder 1"/>
+          <p:cNvPr id="63" name="PlaceHolder 1"/>
           <p:cNvSpPr>
             <a:spLocks noGrp="1"/>
           </p:cNvSpPr>
@@ -322,19 +321,19 @@
         <p:spPr>
           <a:xfrm>
             <a:off x="685800" y="1143000"/>
-            <a:ext cx="5486040" cy="3085920"/>
-          </a:xfrm>
-          <a:prstGeom prst="rect">
-            <a:avLst/>
-          </a:prstGeom>
-          <a:ln w="0">
-            <a:noFill/>
-          </a:ln>
-        </p:spPr>
-      </p:sp>
-      <p:sp>
-        <p:nvSpPr>
-          <p:cNvPr id="61" name="PlaceHolder 2"/>
+            <a:ext cx="5485680" cy="3085560"/>
+          </a:xfrm>
+          <a:prstGeom prst="rect">
+            <a:avLst/>
+          </a:prstGeom>
+          <a:ln w="0">
+            <a:noFill/>
+          </a:ln>
+        </p:spPr>
+      </p:sp>
+      <p:sp>
+        <p:nvSpPr>
+          <p:cNvPr id="64" name="PlaceHolder 2"/>
           <p:cNvSpPr>
             <a:spLocks noGrp="1"/>
           </p:cNvSpPr>
@@ -345,18 +344,18 @@
         <p:spPr>
           <a:xfrm>
             <a:off x="685800" y="4400640"/>
-            <a:ext cx="5486040" cy="3600000"/>
-          </a:xfrm>
-          <a:prstGeom prst="rect">
-            <a:avLst/>
-          </a:prstGeom>
-          <a:noFill/>
-          <a:ln w="0">
-            <a:noFill/>
-          </a:ln>
-        </p:spPr>
-        <p:txBody>
-          <a:bodyPr anchor="t">
+            <a:ext cx="5485680" cy="3599640"/>
+          </a:xfrm>
+          <a:prstGeom prst="rect">
+            <a:avLst/>
+          </a:prstGeom>
+          <a:noFill/>
+          <a:ln w="0">
+            <a:noFill/>
+          </a:ln>
+        </p:spPr>
+        <p:txBody>
+          <a:bodyPr lIns="0" rIns="0" tIns="0" bIns="0" anchor="t">
             <a:noAutofit/>
           </a:bodyPr>
           <a:p>
@@ -368,7 +367,7 @@
       </p:sp>
       <p:sp>
         <p:nvSpPr>
-          <p:cNvPr id="62" name="PlaceHolder 3"/>
+          <p:cNvPr id="65" name="PlaceHolder 3"/>
           <p:cNvSpPr>
             <a:spLocks noGrp="1"/>
           </p:cNvSpPr>
@@ -379,18 +378,18 @@
         <p:spPr>
           <a:xfrm>
             <a:off x="3884760" y="8685360"/>
-            <a:ext cx="2971440" cy="458280"/>
-          </a:xfrm>
-          <a:prstGeom prst="rect">
-            <a:avLst/>
-          </a:prstGeom>
-          <a:noFill/>
-          <a:ln w="0">
-            <a:noFill/>
-          </a:ln>
-        </p:spPr>
-        <p:txBody>
-          <a:bodyPr anchor="b">
+            <a:ext cx="2971080" cy="457920"/>
+          </a:xfrm>
+          <a:prstGeom prst="rect">
+            <a:avLst/>
+          </a:prstGeom>
+          <a:noFill/>
+          <a:ln w="0">
+            <a:noFill/>
+          </a:ln>
+        </p:spPr>
+        <p:txBody>
+          <a:bodyPr lIns="0" rIns="0" tIns="0" bIns="0" anchor="b">
             <a:noAutofit/>
           </a:bodyPr>
           <a:p>
@@ -400,7 +399,7 @@
               </a:lnSpc>
               <a:buNone/>
             </a:pPr>
-            <a:fld id="{2BE56396-B510-45E0-8136-BDF68ECA5A79}" type="slidenum">
+            <a:fld id="{8F57A40E-8BD3-433B-B80B-C79FE50B7BE7}" type="slidenum">
               <a:rPr b="0" lang="en-GB" sz="1200" spc="-1" strike="noStrike">
                 <a:latin typeface="Times New Roman"/>
               </a:rPr>
@@ -458,7 +457,7 @@
       </p:grpSpPr>
       <p:sp>
         <p:nvSpPr>
-          <p:cNvPr id="26" name="PlaceHolder 1"/>
+          <p:cNvPr id="23" name="PlaceHolder 1"/>
           <p:cNvSpPr>
             <a:spLocks noGrp="1"/>
           </p:cNvSpPr>
@@ -469,7 +468,7 @@
         <p:spPr>
           <a:xfrm>
             <a:off x="2301840" y="1122480"/>
-            <a:ext cx="7587720" cy="2620800"/>
+            <a:ext cx="7587360" cy="2620440"/>
           </a:xfrm>
           <a:prstGeom prst="rect">
             <a:avLst/>
@@ -484,18 +483,18 @@
             <a:noAutofit/>
           </a:bodyPr>
           <a:p>
-            <a:endParaRPr b="0" lang="en-US" sz="1800" spc="-1" strike="noStrike">
-              <a:solidFill>
-                <a:srgbClr val="000000"/>
-              </a:solidFill>
-              <a:latin typeface="Neue Haas Grotesk Text Pro"/>
-            </a:endParaRPr>
-          </a:p>
-        </p:txBody>
-      </p:sp>
-      <p:sp>
-        <p:nvSpPr>
-          <p:cNvPr id="27" name="PlaceHolder 2"/>
+            <a:pPr algn="ctr">
+              <a:buNone/>
+            </a:pPr>
+            <a:endParaRPr b="0" lang="en-GB" sz="4400" spc="-1" strike="noStrike">
+              <a:latin typeface="Arial"/>
+            </a:endParaRPr>
+          </a:p>
+        </p:txBody>
+      </p:sp>
+      <p:sp>
+        <p:nvSpPr>
+          <p:cNvPr id="24" name="PlaceHolder 2"/>
           <p:cNvSpPr>
             <a:spLocks noGrp="1"/>
           </p:cNvSpPr>
@@ -521,18 +520,15 @@
             <a:normAutofit/>
           </a:bodyPr>
           <a:p>
-            <a:endParaRPr b="0" lang="en-US" sz="2000" spc="-1" strike="noStrike">
-              <a:solidFill>
-                <a:srgbClr val="000000"/>
-              </a:solidFill>
-              <a:latin typeface="Neue Haas Grotesk Text Pro"/>
-            </a:endParaRPr>
-          </a:p>
-        </p:txBody>
-      </p:sp>
-      <p:sp>
-        <p:nvSpPr>
-          <p:cNvPr id="28" name="PlaceHolder 3"/>
+            <a:endParaRPr b="0" lang="en-GB" sz="3200" spc="-1" strike="noStrike">
+              <a:latin typeface="Arial"/>
+            </a:endParaRPr>
+          </a:p>
+        </p:txBody>
+      </p:sp>
+      <p:sp>
+        <p:nvSpPr>
+          <p:cNvPr id="25" name="PlaceHolder 3"/>
           <p:cNvSpPr>
             <a:spLocks noGrp="1"/>
           </p:cNvSpPr>
@@ -558,11 +554,8 @@
             <a:normAutofit/>
           </a:bodyPr>
           <a:p>
-            <a:endParaRPr b="0" lang="en-US" sz="2000" spc="-1" strike="noStrike">
-              <a:solidFill>
-                <a:srgbClr val="000000"/>
-              </a:solidFill>
-              <a:latin typeface="Neue Haas Grotesk Text Pro"/>
+            <a:endParaRPr b="0" lang="en-GB" sz="3200" spc="-1" strike="noStrike">
+              <a:latin typeface="Arial"/>
             </a:endParaRPr>
           </a:p>
         </p:txBody>
@@ -591,7 +584,7 @@
       </p:grpSpPr>
       <p:sp>
         <p:nvSpPr>
-          <p:cNvPr id="29" name="PlaceHolder 1"/>
+          <p:cNvPr id="26" name="PlaceHolder 1"/>
           <p:cNvSpPr>
             <a:spLocks noGrp="1"/>
           </p:cNvSpPr>
@@ -602,7 +595,7 @@
         <p:spPr>
           <a:xfrm>
             <a:off x="2301840" y="1122480"/>
-            <a:ext cx="7587720" cy="2620800"/>
+            <a:ext cx="7587360" cy="2620440"/>
           </a:xfrm>
           <a:prstGeom prst="rect">
             <a:avLst/>
@@ -617,18 +610,18 @@
             <a:noAutofit/>
           </a:bodyPr>
           <a:p>
-            <a:endParaRPr b="0" lang="en-US" sz="1800" spc="-1" strike="noStrike">
-              <a:solidFill>
-                <a:srgbClr val="000000"/>
-              </a:solidFill>
-              <a:latin typeface="Neue Haas Grotesk Text Pro"/>
-            </a:endParaRPr>
-          </a:p>
-        </p:txBody>
-      </p:sp>
-      <p:sp>
-        <p:nvSpPr>
-          <p:cNvPr id="30" name="PlaceHolder 2"/>
+            <a:pPr algn="ctr">
+              <a:buNone/>
+            </a:pPr>
+            <a:endParaRPr b="0" lang="en-GB" sz="4400" spc="-1" strike="noStrike">
+              <a:latin typeface="Arial"/>
+            </a:endParaRPr>
+          </a:p>
+        </p:txBody>
+      </p:sp>
+      <p:sp>
+        <p:nvSpPr>
+          <p:cNvPr id="27" name="PlaceHolder 2"/>
           <p:cNvSpPr>
             <a:spLocks noGrp="1"/>
           </p:cNvSpPr>
@@ -654,18 +647,15 @@
             <a:normAutofit/>
           </a:bodyPr>
           <a:p>
-            <a:endParaRPr b="0" lang="en-US" sz="2000" spc="-1" strike="noStrike">
-              <a:solidFill>
-                <a:srgbClr val="000000"/>
-              </a:solidFill>
-              <a:latin typeface="Neue Haas Grotesk Text Pro"/>
-            </a:endParaRPr>
-          </a:p>
-        </p:txBody>
-      </p:sp>
-      <p:sp>
-        <p:nvSpPr>
-          <p:cNvPr id="31" name="PlaceHolder 3"/>
+            <a:endParaRPr b="0" lang="en-GB" sz="3200" spc="-1" strike="noStrike">
+              <a:latin typeface="Arial"/>
+            </a:endParaRPr>
+          </a:p>
+        </p:txBody>
+      </p:sp>
+      <p:sp>
+        <p:nvSpPr>
+          <p:cNvPr id="28" name="PlaceHolder 3"/>
           <p:cNvSpPr>
             <a:spLocks noGrp="1"/>
           </p:cNvSpPr>
@@ -691,18 +681,15 @@
             <a:normAutofit/>
           </a:bodyPr>
           <a:p>
-            <a:endParaRPr b="0" lang="en-US" sz="2000" spc="-1" strike="noStrike">
-              <a:solidFill>
-                <a:srgbClr val="000000"/>
-              </a:solidFill>
-              <a:latin typeface="Neue Haas Grotesk Text Pro"/>
-            </a:endParaRPr>
-          </a:p>
-        </p:txBody>
-      </p:sp>
-      <p:sp>
-        <p:nvSpPr>
-          <p:cNvPr id="32" name="PlaceHolder 4"/>
+            <a:endParaRPr b="0" lang="en-GB" sz="3200" spc="-1" strike="noStrike">
+              <a:latin typeface="Arial"/>
+            </a:endParaRPr>
+          </a:p>
+        </p:txBody>
+      </p:sp>
+      <p:sp>
+        <p:nvSpPr>
+          <p:cNvPr id="29" name="PlaceHolder 4"/>
           <p:cNvSpPr>
             <a:spLocks noGrp="1"/>
           </p:cNvSpPr>
@@ -728,18 +715,15 @@
             <a:normAutofit/>
           </a:bodyPr>
           <a:p>
-            <a:endParaRPr b="0" lang="en-US" sz="2000" spc="-1" strike="noStrike">
-              <a:solidFill>
-                <a:srgbClr val="000000"/>
-              </a:solidFill>
-              <a:latin typeface="Neue Haas Grotesk Text Pro"/>
-            </a:endParaRPr>
-          </a:p>
-        </p:txBody>
-      </p:sp>
-      <p:sp>
-        <p:nvSpPr>
-          <p:cNvPr id="33" name="PlaceHolder 5"/>
+            <a:endParaRPr b="0" lang="en-GB" sz="3200" spc="-1" strike="noStrike">
+              <a:latin typeface="Arial"/>
+            </a:endParaRPr>
+          </a:p>
+        </p:txBody>
+      </p:sp>
+      <p:sp>
+        <p:nvSpPr>
+          <p:cNvPr id="30" name="PlaceHolder 5"/>
           <p:cNvSpPr>
             <a:spLocks noGrp="1"/>
           </p:cNvSpPr>
@@ -765,11 +749,8 @@
             <a:normAutofit/>
           </a:bodyPr>
           <a:p>
-            <a:endParaRPr b="0" lang="en-US" sz="2000" spc="-1" strike="noStrike">
-              <a:solidFill>
-                <a:srgbClr val="000000"/>
-              </a:solidFill>
-              <a:latin typeface="Neue Haas Grotesk Text Pro"/>
+            <a:endParaRPr b="0" lang="en-GB" sz="3200" spc="-1" strike="noStrike">
+              <a:latin typeface="Arial"/>
             </a:endParaRPr>
           </a:p>
         </p:txBody>
@@ -798,7 +779,7 @@
       </p:grpSpPr>
       <p:sp>
         <p:nvSpPr>
-          <p:cNvPr id="34" name="PlaceHolder 1"/>
+          <p:cNvPr id="31" name="PlaceHolder 1"/>
           <p:cNvSpPr>
             <a:spLocks noGrp="1"/>
           </p:cNvSpPr>
@@ -809,7 +790,7 @@
         <p:spPr>
           <a:xfrm>
             <a:off x="2301840" y="1122480"/>
-            <a:ext cx="7587720" cy="2620800"/>
+            <a:ext cx="7587360" cy="2620440"/>
           </a:xfrm>
           <a:prstGeom prst="rect">
             <a:avLst/>
@@ -824,18 +805,18 @@
             <a:noAutofit/>
           </a:bodyPr>
           <a:p>
-            <a:endParaRPr b="0" lang="en-US" sz="1800" spc="-1" strike="noStrike">
-              <a:solidFill>
-                <a:srgbClr val="000000"/>
-              </a:solidFill>
-              <a:latin typeface="Neue Haas Grotesk Text Pro"/>
-            </a:endParaRPr>
-          </a:p>
-        </p:txBody>
-      </p:sp>
-      <p:sp>
-        <p:nvSpPr>
-          <p:cNvPr id="35" name="PlaceHolder 2"/>
+            <a:pPr algn="ctr">
+              <a:buNone/>
+            </a:pPr>
+            <a:endParaRPr b="0" lang="en-GB" sz="4400" spc="-1" strike="noStrike">
+              <a:latin typeface="Arial"/>
+            </a:endParaRPr>
+          </a:p>
+        </p:txBody>
+      </p:sp>
+      <p:sp>
+        <p:nvSpPr>
+          <p:cNvPr id="32" name="PlaceHolder 2"/>
           <p:cNvSpPr>
             <a:spLocks noGrp="1"/>
           </p:cNvSpPr>
@@ -861,18 +842,15 @@
             <a:normAutofit/>
           </a:bodyPr>
           <a:p>
-            <a:endParaRPr b="0" lang="en-US" sz="2000" spc="-1" strike="noStrike">
-              <a:solidFill>
-                <a:srgbClr val="000000"/>
-              </a:solidFill>
-              <a:latin typeface="Neue Haas Grotesk Text Pro"/>
-            </a:endParaRPr>
-          </a:p>
-        </p:txBody>
-      </p:sp>
-      <p:sp>
-        <p:nvSpPr>
-          <p:cNvPr id="36" name="PlaceHolder 3"/>
+            <a:endParaRPr b="0" lang="en-GB" sz="3200" spc="-1" strike="noStrike">
+              <a:latin typeface="Arial"/>
+            </a:endParaRPr>
+          </a:p>
+        </p:txBody>
+      </p:sp>
+      <p:sp>
+        <p:nvSpPr>
+          <p:cNvPr id="33" name="PlaceHolder 3"/>
           <p:cNvSpPr>
             <a:spLocks noGrp="1"/>
           </p:cNvSpPr>
@@ -898,18 +876,15 @@
             <a:normAutofit/>
           </a:bodyPr>
           <a:p>
-            <a:endParaRPr b="0" lang="en-US" sz="2000" spc="-1" strike="noStrike">
-              <a:solidFill>
-                <a:srgbClr val="000000"/>
-              </a:solidFill>
-              <a:latin typeface="Neue Haas Grotesk Text Pro"/>
-            </a:endParaRPr>
-          </a:p>
-        </p:txBody>
-      </p:sp>
-      <p:sp>
-        <p:nvSpPr>
-          <p:cNvPr id="37" name="PlaceHolder 4"/>
+            <a:endParaRPr b="0" lang="en-GB" sz="3200" spc="-1" strike="noStrike">
+              <a:latin typeface="Arial"/>
+            </a:endParaRPr>
+          </a:p>
+        </p:txBody>
+      </p:sp>
+      <p:sp>
+        <p:nvSpPr>
+          <p:cNvPr id="34" name="PlaceHolder 4"/>
           <p:cNvSpPr>
             <a:spLocks noGrp="1"/>
           </p:cNvSpPr>
@@ -935,18 +910,15 @@
             <a:normAutofit/>
           </a:bodyPr>
           <a:p>
-            <a:endParaRPr b="0" lang="en-US" sz="2000" spc="-1" strike="noStrike">
-              <a:solidFill>
-                <a:srgbClr val="000000"/>
-              </a:solidFill>
-              <a:latin typeface="Neue Haas Grotesk Text Pro"/>
-            </a:endParaRPr>
-          </a:p>
-        </p:txBody>
-      </p:sp>
-      <p:sp>
-        <p:nvSpPr>
-          <p:cNvPr id="38" name="PlaceHolder 5"/>
+            <a:endParaRPr b="0" lang="en-GB" sz="3200" spc="-1" strike="noStrike">
+              <a:latin typeface="Arial"/>
+            </a:endParaRPr>
+          </a:p>
+        </p:txBody>
+      </p:sp>
+      <p:sp>
+        <p:nvSpPr>
+          <p:cNvPr id="35" name="PlaceHolder 5"/>
           <p:cNvSpPr>
             <a:spLocks noGrp="1"/>
           </p:cNvSpPr>
@@ -972,18 +944,15 @@
             <a:normAutofit/>
           </a:bodyPr>
           <a:p>
-            <a:endParaRPr b="0" lang="en-US" sz="2000" spc="-1" strike="noStrike">
-              <a:solidFill>
-                <a:srgbClr val="000000"/>
-              </a:solidFill>
-              <a:latin typeface="Neue Haas Grotesk Text Pro"/>
-            </a:endParaRPr>
-          </a:p>
-        </p:txBody>
-      </p:sp>
-      <p:sp>
-        <p:nvSpPr>
-          <p:cNvPr id="39" name="PlaceHolder 6"/>
+            <a:endParaRPr b="0" lang="en-GB" sz="3200" spc="-1" strike="noStrike">
+              <a:latin typeface="Arial"/>
+            </a:endParaRPr>
+          </a:p>
+        </p:txBody>
+      </p:sp>
+      <p:sp>
+        <p:nvSpPr>
+          <p:cNvPr id="36" name="PlaceHolder 6"/>
           <p:cNvSpPr>
             <a:spLocks noGrp="1"/>
           </p:cNvSpPr>
@@ -1009,18 +978,15 @@
             <a:normAutofit/>
           </a:bodyPr>
           <a:p>
-            <a:endParaRPr b="0" lang="en-US" sz="2000" spc="-1" strike="noStrike">
-              <a:solidFill>
-                <a:srgbClr val="000000"/>
-              </a:solidFill>
-              <a:latin typeface="Neue Haas Grotesk Text Pro"/>
-            </a:endParaRPr>
-          </a:p>
-        </p:txBody>
-      </p:sp>
-      <p:sp>
-        <p:nvSpPr>
-          <p:cNvPr id="40" name="PlaceHolder 7"/>
+            <a:endParaRPr b="0" lang="en-GB" sz="3200" spc="-1" strike="noStrike">
+              <a:latin typeface="Arial"/>
+            </a:endParaRPr>
+          </a:p>
+        </p:txBody>
+      </p:sp>
+      <p:sp>
+        <p:nvSpPr>
+          <p:cNvPr id="37" name="PlaceHolder 7"/>
           <p:cNvSpPr>
             <a:spLocks noGrp="1"/>
           </p:cNvSpPr>
@@ -1046,11 +1012,8 @@
             <a:normAutofit/>
           </a:bodyPr>
           <a:p>
-            <a:endParaRPr b="0" lang="en-US" sz="2000" spc="-1" strike="noStrike">
-              <a:solidFill>
-                <a:srgbClr val="000000"/>
-              </a:solidFill>
-              <a:latin typeface="Neue Haas Grotesk Text Pro"/>
+            <a:endParaRPr b="0" lang="en-GB" sz="3200" spc="-1" strike="noStrike">
+              <a:latin typeface="Arial"/>
             </a:endParaRPr>
           </a:p>
         </p:txBody>
@@ -1079,7 +1042,7 @@
       </p:grpSpPr>
       <p:sp>
         <p:nvSpPr>
-          <p:cNvPr id="5" name="PlaceHolder 1"/>
+          <p:cNvPr id="2" name="PlaceHolder 1"/>
           <p:cNvSpPr>
             <a:spLocks noGrp="1"/>
           </p:cNvSpPr>
@@ -1090,7 +1053,7 @@
         <p:spPr>
           <a:xfrm>
             <a:off x="2301840" y="1122480"/>
-            <a:ext cx="7587720" cy="2620800"/>
+            <a:ext cx="7587360" cy="2620440"/>
           </a:xfrm>
           <a:prstGeom prst="rect">
             <a:avLst/>
@@ -1105,18 +1068,18 @@
             <a:noAutofit/>
           </a:bodyPr>
           <a:p>
-            <a:endParaRPr b="0" lang="en-US" sz="1800" spc="-1" strike="noStrike">
-              <a:solidFill>
-                <a:srgbClr val="000000"/>
-              </a:solidFill>
-              <a:latin typeface="Neue Haas Grotesk Text Pro"/>
-            </a:endParaRPr>
-          </a:p>
-        </p:txBody>
-      </p:sp>
-      <p:sp>
-        <p:nvSpPr>
-          <p:cNvPr id="6" name="PlaceHolder 2"/>
+            <a:pPr algn="ctr">
+              <a:buNone/>
+            </a:pPr>
+            <a:endParaRPr b="0" lang="en-GB" sz="4400" spc="-1" strike="noStrike">
+              <a:latin typeface="Arial"/>
+            </a:endParaRPr>
+          </a:p>
+        </p:txBody>
+      </p:sp>
+      <p:sp>
+        <p:nvSpPr>
+          <p:cNvPr id="3" name="PlaceHolder 2"/>
           <p:cNvSpPr>
             <a:spLocks noGrp="1"/>
           </p:cNvSpPr>
@@ -1175,7 +1138,7 @@
       </p:grpSpPr>
       <p:sp>
         <p:nvSpPr>
-          <p:cNvPr id="7" name="PlaceHolder 1"/>
+          <p:cNvPr id="4" name="PlaceHolder 1"/>
           <p:cNvSpPr>
             <a:spLocks noGrp="1"/>
           </p:cNvSpPr>
@@ -1186,7 +1149,7 @@
         <p:spPr>
           <a:xfrm>
             <a:off x="2301840" y="1122480"/>
-            <a:ext cx="7587720" cy="2620800"/>
+            <a:ext cx="7587360" cy="2620440"/>
           </a:xfrm>
           <a:prstGeom prst="rect">
             <a:avLst/>
@@ -1201,18 +1164,18 @@
             <a:noAutofit/>
           </a:bodyPr>
           <a:p>
-            <a:endParaRPr b="0" lang="en-US" sz="1800" spc="-1" strike="noStrike">
-              <a:solidFill>
-                <a:srgbClr val="000000"/>
-              </a:solidFill>
-              <a:latin typeface="Neue Haas Grotesk Text Pro"/>
-            </a:endParaRPr>
-          </a:p>
-        </p:txBody>
-      </p:sp>
-      <p:sp>
-        <p:nvSpPr>
-          <p:cNvPr id="8" name="PlaceHolder 2"/>
+            <a:pPr algn="ctr">
+              <a:buNone/>
+            </a:pPr>
+            <a:endParaRPr b="0" lang="en-GB" sz="4400" spc="-1" strike="noStrike">
+              <a:latin typeface="Arial"/>
+            </a:endParaRPr>
+          </a:p>
+        </p:txBody>
+      </p:sp>
+      <p:sp>
+        <p:nvSpPr>
+          <p:cNvPr id="5" name="PlaceHolder 2"/>
           <p:cNvSpPr>
             <a:spLocks noGrp="1"/>
           </p:cNvSpPr>
@@ -1238,11 +1201,8 @@
             <a:normAutofit/>
           </a:bodyPr>
           <a:p>
-            <a:endParaRPr b="0" lang="en-US" sz="2000" spc="-1" strike="noStrike">
-              <a:solidFill>
-                <a:srgbClr val="000000"/>
-              </a:solidFill>
-              <a:latin typeface="Neue Haas Grotesk Text Pro"/>
+            <a:endParaRPr b="0" lang="en-GB" sz="3200" spc="-1" strike="noStrike">
+              <a:latin typeface="Arial"/>
             </a:endParaRPr>
           </a:p>
         </p:txBody>
@@ -1271,7 +1231,7 @@
       </p:grpSpPr>
       <p:sp>
         <p:nvSpPr>
-          <p:cNvPr id="9" name="PlaceHolder 1"/>
+          <p:cNvPr id="6" name="PlaceHolder 1"/>
           <p:cNvSpPr>
             <a:spLocks noGrp="1"/>
           </p:cNvSpPr>
@@ -1282,7 +1242,7 @@
         <p:spPr>
           <a:xfrm>
             <a:off x="2301840" y="1122480"/>
-            <a:ext cx="7587720" cy="2620800"/>
+            <a:ext cx="7587360" cy="2620440"/>
           </a:xfrm>
           <a:prstGeom prst="rect">
             <a:avLst/>
@@ -1297,18 +1257,18 @@
             <a:noAutofit/>
           </a:bodyPr>
           <a:p>
-            <a:endParaRPr b="0" lang="en-US" sz="1800" spc="-1" strike="noStrike">
-              <a:solidFill>
-                <a:srgbClr val="000000"/>
-              </a:solidFill>
-              <a:latin typeface="Neue Haas Grotesk Text Pro"/>
-            </a:endParaRPr>
-          </a:p>
-        </p:txBody>
-      </p:sp>
-      <p:sp>
-        <p:nvSpPr>
-          <p:cNvPr id="10" name="PlaceHolder 2"/>
+            <a:pPr algn="ctr">
+              <a:buNone/>
+            </a:pPr>
+            <a:endParaRPr b="0" lang="en-GB" sz="4400" spc="-1" strike="noStrike">
+              <a:latin typeface="Arial"/>
+            </a:endParaRPr>
+          </a:p>
+        </p:txBody>
+      </p:sp>
+      <p:sp>
+        <p:nvSpPr>
+          <p:cNvPr id="7" name="PlaceHolder 2"/>
           <p:cNvSpPr>
             <a:spLocks noGrp="1"/>
           </p:cNvSpPr>
@@ -1334,18 +1294,15 @@
             <a:normAutofit/>
           </a:bodyPr>
           <a:p>
-            <a:endParaRPr b="0" lang="en-US" sz="2000" spc="-1" strike="noStrike">
-              <a:solidFill>
-                <a:srgbClr val="000000"/>
-              </a:solidFill>
-              <a:latin typeface="Neue Haas Grotesk Text Pro"/>
-            </a:endParaRPr>
-          </a:p>
-        </p:txBody>
-      </p:sp>
-      <p:sp>
-        <p:nvSpPr>
-          <p:cNvPr id="11" name="PlaceHolder 3"/>
+            <a:endParaRPr b="0" lang="en-GB" sz="3200" spc="-1" strike="noStrike">
+              <a:latin typeface="Arial"/>
+            </a:endParaRPr>
+          </a:p>
+        </p:txBody>
+      </p:sp>
+      <p:sp>
+        <p:nvSpPr>
+          <p:cNvPr id="8" name="PlaceHolder 3"/>
           <p:cNvSpPr>
             <a:spLocks noGrp="1"/>
           </p:cNvSpPr>
@@ -1371,11 +1328,8 @@
             <a:normAutofit/>
           </a:bodyPr>
           <a:p>
-            <a:endParaRPr b="0" lang="en-US" sz="2000" spc="-1" strike="noStrike">
-              <a:solidFill>
-                <a:srgbClr val="000000"/>
-              </a:solidFill>
-              <a:latin typeface="Neue Haas Grotesk Text Pro"/>
+            <a:endParaRPr b="0" lang="en-GB" sz="3200" spc="-1" strike="noStrike">
+              <a:latin typeface="Arial"/>
             </a:endParaRPr>
           </a:p>
         </p:txBody>
@@ -1404,7 +1358,7 @@
       </p:grpSpPr>
       <p:sp>
         <p:nvSpPr>
-          <p:cNvPr id="12" name="PlaceHolder 1"/>
+          <p:cNvPr id="9" name="PlaceHolder 1"/>
           <p:cNvSpPr>
             <a:spLocks noGrp="1"/>
           </p:cNvSpPr>
@@ -1415,7 +1369,7 @@
         <p:spPr>
           <a:xfrm>
             <a:off x="2301840" y="1122480"/>
-            <a:ext cx="7587720" cy="2620800"/>
+            <a:ext cx="7587360" cy="2620440"/>
           </a:xfrm>
           <a:prstGeom prst="rect">
             <a:avLst/>
@@ -1430,11 +1384,11 @@
             <a:noAutofit/>
           </a:bodyPr>
           <a:p>
-            <a:endParaRPr b="0" lang="en-US" sz="1800" spc="-1" strike="noStrike">
-              <a:solidFill>
-                <a:srgbClr val="000000"/>
-              </a:solidFill>
-              <a:latin typeface="Neue Haas Grotesk Text Pro"/>
+            <a:pPr algn="ctr">
+              <a:buNone/>
+            </a:pPr>
+            <a:endParaRPr b="0" lang="en-GB" sz="4400" spc="-1" strike="noStrike">
+              <a:latin typeface="Arial"/>
             </a:endParaRPr>
           </a:p>
         </p:txBody>
@@ -1463,7 +1417,7 @@
       </p:grpSpPr>
       <p:sp>
         <p:nvSpPr>
-          <p:cNvPr id="13" name="PlaceHolder 1"/>
+          <p:cNvPr id="10" name="PlaceHolder 1"/>
           <p:cNvSpPr>
             <a:spLocks noGrp="1"/>
           </p:cNvSpPr>
@@ -1474,7 +1428,7 @@
         <p:spPr>
           <a:xfrm>
             <a:off x="2301840" y="1122480"/>
-            <a:ext cx="7587720" cy="12149640"/>
+            <a:ext cx="7587360" cy="12148200"/>
           </a:xfrm>
           <a:prstGeom prst="rect">
             <a:avLst/>
@@ -1522,7 +1476,7 @@
       </p:grpSpPr>
       <p:sp>
         <p:nvSpPr>
-          <p:cNvPr id="14" name="PlaceHolder 1"/>
+          <p:cNvPr id="11" name="PlaceHolder 1"/>
           <p:cNvSpPr>
             <a:spLocks noGrp="1"/>
           </p:cNvSpPr>
@@ -1533,7 +1487,7 @@
         <p:spPr>
           <a:xfrm>
             <a:off x="2301840" y="1122480"/>
-            <a:ext cx="7587720" cy="2620800"/>
+            <a:ext cx="7587360" cy="2620440"/>
           </a:xfrm>
           <a:prstGeom prst="rect">
             <a:avLst/>
@@ -1548,18 +1502,18 @@
             <a:noAutofit/>
           </a:bodyPr>
           <a:p>
-            <a:endParaRPr b="0" lang="en-US" sz="1800" spc="-1" strike="noStrike">
-              <a:solidFill>
-                <a:srgbClr val="000000"/>
-              </a:solidFill>
-              <a:latin typeface="Neue Haas Grotesk Text Pro"/>
-            </a:endParaRPr>
-          </a:p>
-        </p:txBody>
-      </p:sp>
-      <p:sp>
-        <p:nvSpPr>
-          <p:cNvPr id="15" name="PlaceHolder 2"/>
+            <a:pPr algn="ctr">
+              <a:buNone/>
+            </a:pPr>
+            <a:endParaRPr b="0" lang="en-GB" sz="4400" spc="-1" strike="noStrike">
+              <a:latin typeface="Arial"/>
+            </a:endParaRPr>
+          </a:p>
+        </p:txBody>
+      </p:sp>
+      <p:sp>
+        <p:nvSpPr>
+          <p:cNvPr id="12" name="PlaceHolder 2"/>
           <p:cNvSpPr>
             <a:spLocks noGrp="1"/>
           </p:cNvSpPr>
@@ -1585,18 +1539,15 @@
             <a:normAutofit/>
           </a:bodyPr>
           <a:p>
-            <a:endParaRPr b="0" lang="en-US" sz="2000" spc="-1" strike="noStrike">
-              <a:solidFill>
-                <a:srgbClr val="000000"/>
-              </a:solidFill>
-              <a:latin typeface="Neue Haas Grotesk Text Pro"/>
-            </a:endParaRPr>
-          </a:p>
-        </p:txBody>
-      </p:sp>
-      <p:sp>
-        <p:nvSpPr>
-          <p:cNvPr id="16" name="PlaceHolder 3"/>
+            <a:endParaRPr b="0" lang="en-GB" sz="3200" spc="-1" strike="noStrike">
+              <a:latin typeface="Arial"/>
+            </a:endParaRPr>
+          </a:p>
+        </p:txBody>
+      </p:sp>
+      <p:sp>
+        <p:nvSpPr>
+          <p:cNvPr id="13" name="PlaceHolder 3"/>
           <p:cNvSpPr>
             <a:spLocks noGrp="1"/>
           </p:cNvSpPr>
@@ -1622,18 +1573,15 @@
             <a:normAutofit/>
           </a:bodyPr>
           <a:p>
-            <a:endParaRPr b="0" lang="en-US" sz="2000" spc="-1" strike="noStrike">
-              <a:solidFill>
-                <a:srgbClr val="000000"/>
-              </a:solidFill>
-              <a:latin typeface="Neue Haas Grotesk Text Pro"/>
-            </a:endParaRPr>
-          </a:p>
-        </p:txBody>
-      </p:sp>
-      <p:sp>
-        <p:nvSpPr>
-          <p:cNvPr id="17" name="PlaceHolder 4"/>
+            <a:endParaRPr b="0" lang="en-GB" sz="3200" spc="-1" strike="noStrike">
+              <a:latin typeface="Arial"/>
+            </a:endParaRPr>
+          </a:p>
+        </p:txBody>
+      </p:sp>
+      <p:sp>
+        <p:nvSpPr>
+          <p:cNvPr id="14" name="PlaceHolder 4"/>
           <p:cNvSpPr>
             <a:spLocks noGrp="1"/>
           </p:cNvSpPr>
@@ -1659,11 +1607,8 @@
             <a:normAutofit/>
           </a:bodyPr>
           <a:p>
-            <a:endParaRPr b="0" lang="en-US" sz="2000" spc="-1" strike="noStrike">
-              <a:solidFill>
-                <a:srgbClr val="000000"/>
-              </a:solidFill>
-              <a:latin typeface="Neue Haas Grotesk Text Pro"/>
+            <a:endParaRPr b="0" lang="en-GB" sz="3200" spc="-1" strike="noStrike">
+              <a:latin typeface="Arial"/>
             </a:endParaRPr>
           </a:p>
         </p:txBody>
@@ -1692,7 +1637,7 @@
       </p:grpSpPr>
       <p:sp>
         <p:nvSpPr>
-          <p:cNvPr id="18" name="PlaceHolder 1"/>
+          <p:cNvPr id="15" name="PlaceHolder 1"/>
           <p:cNvSpPr>
             <a:spLocks noGrp="1"/>
           </p:cNvSpPr>
@@ -1703,7 +1648,7 @@
         <p:spPr>
           <a:xfrm>
             <a:off x="2301840" y="1122480"/>
-            <a:ext cx="7587720" cy="2620800"/>
+            <a:ext cx="7587360" cy="2620440"/>
           </a:xfrm>
           <a:prstGeom prst="rect">
             <a:avLst/>
@@ -1718,18 +1663,18 @@
             <a:noAutofit/>
           </a:bodyPr>
           <a:p>
-            <a:endParaRPr b="0" lang="en-US" sz="1800" spc="-1" strike="noStrike">
-              <a:solidFill>
-                <a:srgbClr val="000000"/>
-              </a:solidFill>
-              <a:latin typeface="Neue Haas Grotesk Text Pro"/>
-            </a:endParaRPr>
-          </a:p>
-        </p:txBody>
-      </p:sp>
-      <p:sp>
-        <p:nvSpPr>
-          <p:cNvPr id="19" name="PlaceHolder 2"/>
+            <a:pPr algn="ctr">
+              <a:buNone/>
+            </a:pPr>
+            <a:endParaRPr b="0" lang="en-GB" sz="4400" spc="-1" strike="noStrike">
+              <a:latin typeface="Arial"/>
+            </a:endParaRPr>
+          </a:p>
+        </p:txBody>
+      </p:sp>
+      <p:sp>
+        <p:nvSpPr>
+          <p:cNvPr id="16" name="PlaceHolder 2"/>
           <p:cNvSpPr>
             <a:spLocks noGrp="1"/>
           </p:cNvSpPr>
@@ -1755,18 +1700,15 @@
             <a:normAutofit/>
           </a:bodyPr>
           <a:p>
-            <a:endParaRPr b="0" lang="en-US" sz="2000" spc="-1" strike="noStrike">
-              <a:solidFill>
-                <a:srgbClr val="000000"/>
-              </a:solidFill>
-              <a:latin typeface="Neue Haas Grotesk Text Pro"/>
-            </a:endParaRPr>
-          </a:p>
-        </p:txBody>
-      </p:sp>
-      <p:sp>
-        <p:nvSpPr>
-          <p:cNvPr id="20" name="PlaceHolder 3"/>
+            <a:endParaRPr b="0" lang="en-GB" sz="3200" spc="-1" strike="noStrike">
+              <a:latin typeface="Arial"/>
+            </a:endParaRPr>
+          </a:p>
+        </p:txBody>
+      </p:sp>
+      <p:sp>
+        <p:nvSpPr>
+          <p:cNvPr id="17" name="PlaceHolder 3"/>
           <p:cNvSpPr>
             <a:spLocks noGrp="1"/>
           </p:cNvSpPr>
@@ -1792,18 +1734,15 @@
             <a:normAutofit/>
           </a:bodyPr>
           <a:p>
-            <a:endParaRPr b="0" lang="en-US" sz="2000" spc="-1" strike="noStrike">
-              <a:solidFill>
-                <a:srgbClr val="000000"/>
-              </a:solidFill>
-              <a:latin typeface="Neue Haas Grotesk Text Pro"/>
-            </a:endParaRPr>
-          </a:p>
-        </p:txBody>
-      </p:sp>
-      <p:sp>
-        <p:nvSpPr>
-          <p:cNvPr id="21" name="PlaceHolder 4"/>
+            <a:endParaRPr b="0" lang="en-GB" sz="3200" spc="-1" strike="noStrike">
+              <a:latin typeface="Arial"/>
+            </a:endParaRPr>
+          </a:p>
+        </p:txBody>
+      </p:sp>
+      <p:sp>
+        <p:nvSpPr>
+          <p:cNvPr id="18" name="PlaceHolder 4"/>
           <p:cNvSpPr>
             <a:spLocks noGrp="1"/>
           </p:cNvSpPr>
@@ -1829,11 +1768,8 @@
             <a:normAutofit/>
           </a:bodyPr>
           <a:p>
-            <a:endParaRPr b="0" lang="en-US" sz="2000" spc="-1" strike="noStrike">
-              <a:solidFill>
-                <a:srgbClr val="000000"/>
-              </a:solidFill>
-              <a:latin typeface="Neue Haas Grotesk Text Pro"/>
+            <a:endParaRPr b="0" lang="en-GB" sz="3200" spc="-1" strike="noStrike">
+              <a:latin typeface="Arial"/>
             </a:endParaRPr>
           </a:p>
         </p:txBody>
@@ -1862,7 +1798,7 @@
       </p:grpSpPr>
       <p:sp>
         <p:nvSpPr>
-          <p:cNvPr id="22" name="PlaceHolder 1"/>
+          <p:cNvPr id="19" name="PlaceHolder 1"/>
           <p:cNvSpPr>
             <a:spLocks noGrp="1"/>
           </p:cNvSpPr>
@@ -1873,7 +1809,7 @@
         <p:spPr>
           <a:xfrm>
             <a:off x="2301840" y="1122480"/>
-            <a:ext cx="7587720" cy="2620800"/>
+            <a:ext cx="7587360" cy="2620440"/>
           </a:xfrm>
           <a:prstGeom prst="rect">
             <a:avLst/>
@@ -1888,18 +1824,18 @@
             <a:noAutofit/>
           </a:bodyPr>
           <a:p>
-            <a:endParaRPr b="0" lang="en-US" sz="1800" spc="-1" strike="noStrike">
-              <a:solidFill>
-                <a:srgbClr val="000000"/>
-              </a:solidFill>
-              <a:latin typeface="Neue Haas Grotesk Text Pro"/>
-            </a:endParaRPr>
-          </a:p>
-        </p:txBody>
-      </p:sp>
-      <p:sp>
-        <p:nvSpPr>
-          <p:cNvPr id="23" name="PlaceHolder 2"/>
+            <a:pPr algn="ctr">
+              <a:buNone/>
+            </a:pPr>
+            <a:endParaRPr b="0" lang="en-GB" sz="4400" spc="-1" strike="noStrike">
+              <a:latin typeface="Arial"/>
+            </a:endParaRPr>
+          </a:p>
+        </p:txBody>
+      </p:sp>
+      <p:sp>
+        <p:nvSpPr>
+          <p:cNvPr id="20" name="PlaceHolder 2"/>
           <p:cNvSpPr>
             <a:spLocks noGrp="1"/>
           </p:cNvSpPr>
@@ -1925,18 +1861,15 @@
             <a:normAutofit/>
           </a:bodyPr>
           <a:p>
-            <a:endParaRPr b="0" lang="en-US" sz="2000" spc="-1" strike="noStrike">
-              <a:solidFill>
-                <a:srgbClr val="000000"/>
-              </a:solidFill>
-              <a:latin typeface="Neue Haas Grotesk Text Pro"/>
-            </a:endParaRPr>
-          </a:p>
-        </p:txBody>
-      </p:sp>
-      <p:sp>
-        <p:nvSpPr>
-          <p:cNvPr id="24" name="PlaceHolder 3"/>
+            <a:endParaRPr b="0" lang="en-GB" sz="3200" spc="-1" strike="noStrike">
+              <a:latin typeface="Arial"/>
+            </a:endParaRPr>
+          </a:p>
+        </p:txBody>
+      </p:sp>
+      <p:sp>
+        <p:nvSpPr>
+          <p:cNvPr id="21" name="PlaceHolder 3"/>
           <p:cNvSpPr>
             <a:spLocks noGrp="1"/>
           </p:cNvSpPr>
@@ -1962,18 +1895,15 @@
             <a:normAutofit/>
           </a:bodyPr>
           <a:p>
-            <a:endParaRPr b="0" lang="en-US" sz="2000" spc="-1" strike="noStrike">
-              <a:solidFill>
-                <a:srgbClr val="000000"/>
-              </a:solidFill>
-              <a:latin typeface="Neue Haas Grotesk Text Pro"/>
-            </a:endParaRPr>
-          </a:p>
-        </p:txBody>
-      </p:sp>
-      <p:sp>
-        <p:nvSpPr>
-          <p:cNvPr id="25" name="PlaceHolder 4"/>
+            <a:endParaRPr b="0" lang="en-GB" sz="3200" spc="-1" strike="noStrike">
+              <a:latin typeface="Arial"/>
+            </a:endParaRPr>
+          </a:p>
+        </p:txBody>
+      </p:sp>
+      <p:sp>
+        <p:nvSpPr>
+          <p:cNvPr id="22" name="PlaceHolder 4"/>
           <p:cNvSpPr>
             <a:spLocks noGrp="1"/>
           </p:cNvSpPr>
@@ -1999,11 +1929,8 @@
             <a:normAutofit/>
           </a:bodyPr>
           <a:p>
-            <a:endParaRPr b="0" lang="en-US" sz="2000" spc="-1" strike="noStrike">
-              <a:solidFill>
-                <a:srgbClr val="000000"/>
-              </a:solidFill>
-              <a:latin typeface="Neue Haas Grotesk Text Pro"/>
+            <a:endParaRPr b="0" lang="en-GB" sz="3200" spc="-1" strike="noStrike">
+              <a:latin typeface="Arial"/>
             </a:endParaRPr>
           </a:p>
         </p:txBody>
@@ -2050,41 +1977,29 @@
         <p:spPr>
           <a:xfrm>
             <a:off x="2301840" y="1122480"/>
-            <a:ext cx="7587720" cy="2620800"/>
-          </a:xfrm>
-          <a:prstGeom prst="rect">
-            <a:avLst/>
-          </a:prstGeom>
-          <a:noFill/>
-          <a:ln w="0">
-            <a:noFill/>
-          </a:ln>
-        </p:spPr>
-        <p:txBody>
-          <a:bodyPr anchor="b">
-            <a:normAutofit/>
-          </a:bodyPr>
-          <a:p>
-            <a:pPr algn="ctr">
-              <a:lnSpc>
-                <a:spcPct val="90000"/>
-              </a:lnSpc>
-              <a:buNone/>
-            </a:pPr>
+            <a:ext cx="7587360" cy="2620440"/>
+          </a:xfrm>
+          <a:prstGeom prst="rect">
+            <a:avLst/>
+          </a:prstGeom>
+          <a:noFill/>
+          <a:ln w="0">
+            <a:noFill/>
+          </a:ln>
+        </p:spPr>
+        <p:txBody>
+          <a:bodyPr lIns="0" rIns="0" tIns="0" bIns="0" anchor="ctr">
+            <a:noAutofit/>
+          </a:bodyPr>
+          <a:p>
             <a:r>
-              <a:rPr b="1" lang="en-US" sz="4000" spc="-1" strike="noStrike">
-                <a:solidFill>
-                  <a:srgbClr val="000000"/>
-                </a:solidFill>
-                <a:latin typeface="Neue Haas Grotesk Text Pro"/>
+              <a:rPr b="0" lang="en-GB" sz="1800" spc="-1" strike="noStrike">
+                <a:latin typeface="Arial"/>
               </a:rPr>
-              <a:t>Click to edit Master title style</a:t>
+              <a:t>Click to edit the title text format</a:t>
             </a:r>
-            <a:endParaRPr b="0" lang="en-US" sz="4000" spc="-1" strike="noStrike">
-              <a:solidFill>
-                <a:srgbClr val="000000"/>
-              </a:solidFill>
-              <a:latin typeface="Neue Haas Grotesk Text Pro"/>
+            <a:endParaRPr b="0" lang="en-GB" sz="1800" spc="-1" strike="noStrike">
+              <a:latin typeface="Arial"/>
             </a:endParaRPr>
           </a:p>
         </p:txBody>
@@ -2092,138 +2007,6 @@
       <p:sp>
         <p:nvSpPr>
           <p:cNvPr id="1" name="PlaceHolder 2"/>
-          <p:cNvSpPr>
-            <a:spLocks noGrp="1"/>
-          </p:cNvSpPr>
-          <p:nvPr>
-            <p:ph type="dt"/>
-          </p:nvPr>
-        </p:nvSpPr>
-        <p:spPr>
-          <a:xfrm>
-            <a:off x="137160" y="6453000"/>
-            <a:ext cx="3493800" cy="364680"/>
-          </a:xfrm>
-          <a:prstGeom prst="rect">
-            <a:avLst/>
-          </a:prstGeom>
-          <a:noFill/>
-          <a:ln w="0">
-            <a:noFill/>
-          </a:ln>
-        </p:spPr>
-        <p:txBody>
-          <a:bodyPr anchor="ctr">
-            <a:noAutofit/>
-          </a:bodyPr>
-          <a:p>
-            <a:pPr>
-              <a:lnSpc>
-                <a:spcPct val="100000"/>
-              </a:lnSpc>
-              <a:buNone/>
-            </a:pPr>
-            <a:fld id="{D4CA6910-2A23-4941-A2D2-FA90DB3890EB}" type="datetime1">
-              <a:rPr b="0" lang="en-US" sz="900" spc="-1" strike="noStrike">
-                <a:solidFill>
-                  <a:srgbClr val="000000"/>
-                </a:solidFill>
-                <a:latin typeface="Neue Haas Grotesk Text Pro"/>
-              </a:rPr>
-              <a:t>03/31/2025</a:t>
-            </a:fld>
-            <a:endParaRPr b="0" lang="en-GB" sz="900" spc="-1" strike="noStrike">
-              <a:latin typeface="Times New Roman"/>
-            </a:endParaRPr>
-          </a:p>
-        </p:txBody>
-      </p:sp>
-      <p:sp>
-        <p:nvSpPr>
-          <p:cNvPr id="2" name="PlaceHolder 3"/>
-          <p:cNvSpPr>
-            <a:spLocks noGrp="1"/>
-          </p:cNvSpPr>
-          <p:nvPr>
-            <p:ph type="ftr"/>
-          </p:nvPr>
-        </p:nvSpPr>
-        <p:spPr>
-          <a:xfrm>
-            <a:off x="8876520" y="6453000"/>
-            <a:ext cx="2805120" cy="364680"/>
-          </a:xfrm>
-          <a:prstGeom prst="rect">
-            <a:avLst/>
-          </a:prstGeom>
-          <a:noFill/>
-          <a:ln w="0">
-            <a:noFill/>
-          </a:ln>
-        </p:spPr>
-        <p:txBody>
-          <a:bodyPr anchor="ctr">
-            <a:noAutofit/>
-          </a:bodyPr>
-          <a:p>
-            <a:endParaRPr b="0" lang="en-GB" sz="2400" spc="-1" strike="noStrike">
-              <a:latin typeface="Times New Roman"/>
-            </a:endParaRPr>
-          </a:p>
-        </p:txBody>
-      </p:sp>
-      <p:sp>
-        <p:nvSpPr>
-          <p:cNvPr id="3" name="PlaceHolder 4"/>
-          <p:cNvSpPr>
-            <a:spLocks noGrp="1"/>
-          </p:cNvSpPr>
-          <p:nvPr>
-            <p:ph type="sldNum"/>
-          </p:nvPr>
-        </p:nvSpPr>
-        <p:spPr>
-          <a:xfrm>
-            <a:off x="11632320" y="6453000"/>
-            <a:ext cx="428760" cy="364680"/>
-          </a:xfrm>
-          <a:prstGeom prst="rect">
-            <a:avLst/>
-          </a:prstGeom>
-          <a:noFill/>
-          <a:ln w="0">
-            <a:noFill/>
-          </a:ln>
-        </p:spPr>
-        <p:txBody>
-          <a:bodyPr anchor="ctr">
-            <a:noAutofit/>
-          </a:bodyPr>
-          <a:p>
-            <a:pPr algn="r">
-              <a:lnSpc>
-                <a:spcPct val="100000"/>
-              </a:lnSpc>
-              <a:buNone/>
-            </a:pPr>
-            <a:fld id="{F8D7088E-1263-40FC-B442-9FF77447FEAE}" type="slidenum">
-              <a:rPr b="0" lang="en-US" sz="900" spc="-1" strike="noStrike">
-                <a:solidFill>
-                  <a:srgbClr val="000000"/>
-                </a:solidFill>
-                <a:latin typeface="Neue Haas Grotesk Text Pro"/>
-              </a:rPr>
-              <a:t>&lt;number&gt;</a:t>
-            </a:fld>
-            <a:endParaRPr b="0" lang="en-GB" sz="900" spc="-1" strike="noStrike">
-              <a:latin typeface="Times New Roman"/>
-            </a:endParaRPr>
-          </a:p>
-        </p:txBody>
-      </p:sp>
-      <p:sp>
-        <p:nvSpPr>
-          <p:cNvPr id="4" name="PlaceHolder 5"/>
           <p:cNvSpPr>
             <a:spLocks noGrp="1"/>
           </p:cNvSpPr>
@@ -2261,19 +2044,13 @@
               <a:buChar char=""/>
             </a:pPr>
             <a:r>
-              <a:rPr b="0" lang="en-US" sz="2000" spc="-1" strike="noStrike">
-                <a:solidFill>
-                  <a:srgbClr val="000000"/>
-                </a:solidFill>
-                <a:latin typeface="Neue Haas Grotesk Text Pro"/>
+              <a:rPr b="0" lang="en-GB" sz="3200" spc="-1" strike="noStrike">
+                <a:latin typeface="Arial"/>
               </a:rPr>
               <a:t>Click to edit the outline text format</a:t>
             </a:r>
-            <a:endParaRPr b="0" lang="en-US" sz="2000" spc="-1" strike="noStrike">
-              <a:solidFill>
-                <a:srgbClr val="000000"/>
-              </a:solidFill>
-              <a:latin typeface="Neue Haas Grotesk Text Pro"/>
+            <a:endParaRPr b="0" lang="en-GB" sz="3200" spc="-1" strike="noStrike">
+              <a:latin typeface="Arial"/>
             </a:endParaRPr>
           </a:p>
           <a:p>
@@ -2289,19 +2066,13 @@
               <a:buChar char=""/>
             </a:pPr>
             <a:r>
-              <a:rPr b="0" lang="en-US" sz="1600" spc="-1" strike="noStrike">
-                <a:solidFill>
-                  <a:srgbClr val="000000"/>
-                </a:solidFill>
-                <a:latin typeface="Neue Haas Grotesk Text Pro"/>
+              <a:rPr b="0" lang="en-GB" sz="2800" spc="-1" strike="noStrike">
+                <a:latin typeface="Arial"/>
               </a:rPr>
               <a:t>Second Outline Level</a:t>
             </a:r>
-            <a:endParaRPr b="0" lang="en-US" sz="1600" spc="-1" strike="noStrike">
-              <a:solidFill>
-                <a:srgbClr val="000000"/>
-              </a:solidFill>
-              <a:latin typeface="Neue Haas Grotesk Text Pro"/>
+            <a:endParaRPr b="0" lang="en-GB" sz="2800" spc="-1" strike="noStrike">
+              <a:latin typeface="Arial"/>
             </a:endParaRPr>
           </a:p>
           <a:p>
@@ -2317,19 +2088,13 @@
               <a:buChar char=""/>
             </a:pPr>
             <a:r>
-              <a:rPr b="0" lang="en-US" sz="1400" spc="-1" strike="noStrike">
-                <a:solidFill>
-                  <a:srgbClr val="000000"/>
-                </a:solidFill>
-                <a:latin typeface="Neue Haas Grotesk Text Pro"/>
+              <a:rPr b="0" lang="en-GB" sz="2400" spc="-1" strike="noStrike">
+                <a:latin typeface="Arial"/>
               </a:rPr>
               <a:t>Third Outline Level</a:t>
             </a:r>
-            <a:endParaRPr b="0" lang="en-US" sz="1400" spc="-1" strike="noStrike">
-              <a:solidFill>
-                <a:srgbClr val="000000"/>
-              </a:solidFill>
-              <a:latin typeface="Neue Haas Grotesk Text Pro"/>
+            <a:endParaRPr b="0" lang="en-GB" sz="2400" spc="-1" strike="noStrike">
+              <a:latin typeface="Arial"/>
             </a:endParaRPr>
           </a:p>
           <a:p>
@@ -2345,19 +2110,13 @@
               <a:buChar char=""/>
             </a:pPr>
             <a:r>
-              <a:rPr b="0" lang="en-US" sz="1200" spc="-1" strike="noStrike">
-                <a:solidFill>
-                  <a:srgbClr val="000000"/>
-                </a:solidFill>
-                <a:latin typeface="Neue Haas Grotesk Text Pro"/>
+              <a:rPr b="0" lang="en-GB" sz="2000" spc="-1" strike="noStrike">
+                <a:latin typeface="Arial"/>
               </a:rPr>
               <a:t>Fourth Outline Level</a:t>
             </a:r>
-            <a:endParaRPr b="0" lang="en-US" sz="1200" spc="-1" strike="noStrike">
-              <a:solidFill>
-                <a:srgbClr val="000000"/>
-              </a:solidFill>
-              <a:latin typeface="Neue Haas Grotesk Text Pro"/>
+            <a:endParaRPr b="0" lang="en-GB" sz="2000" spc="-1" strike="noStrike">
+              <a:latin typeface="Arial"/>
             </a:endParaRPr>
           </a:p>
           <a:p>
@@ -2373,19 +2132,13 @@
               <a:buChar char=""/>
             </a:pPr>
             <a:r>
-              <a:rPr b="0" lang="en-US" sz="2000" spc="-1" strike="noStrike">
-                <a:solidFill>
-                  <a:srgbClr val="000000"/>
-                </a:solidFill>
-                <a:latin typeface="Neue Haas Grotesk Text Pro"/>
+              <a:rPr b="0" lang="en-GB" sz="2000" spc="-1" strike="noStrike">
+                <a:latin typeface="Arial"/>
               </a:rPr>
               <a:t>Fifth Outline Level</a:t>
             </a:r>
-            <a:endParaRPr b="0" lang="en-US" sz="2000" spc="-1" strike="noStrike">
-              <a:solidFill>
-                <a:srgbClr val="000000"/>
-              </a:solidFill>
-              <a:latin typeface="Neue Haas Grotesk Text Pro"/>
+            <a:endParaRPr b="0" lang="en-GB" sz="2000" spc="-1" strike="noStrike">
+              <a:latin typeface="Arial"/>
             </a:endParaRPr>
           </a:p>
           <a:p>
@@ -2401,19 +2154,13 @@
               <a:buChar char=""/>
             </a:pPr>
             <a:r>
-              <a:rPr b="0" lang="en-US" sz="2000" spc="-1" strike="noStrike">
-                <a:solidFill>
-                  <a:srgbClr val="000000"/>
-                </a:solidFill>
-                <a:latin typeface="Neue Haas Grotesk Text Pro"/>
+              <a:rPr b="0" lang="en-GB" sz="2000" spc="-1" strike="noStrike">
+                <a:latin typeface="Arial"/>
               </a:rPr>
               <a:t>Sixth Outline Level</a:t>
             </a:r>
-            <a:endParaRPr b="0" lang="en-US" sz="2000" spc="-1" strike="noStrike">
-              <a:solidFill>
-                <a:srgbClr val="000000"/>
-              </a:solidFill>
-              <a:latin typeface="Neue Haas Grotesk Text Pro"/>
+            <a:endParaRPr b="0" lang="en-GB" sz="2000" spc="-1" strike="noStrike">
+              <a:latin typeface="Arial"/>
             </a:endParaRPr>
           </a:p>
           <a:p>
@@ -2429,19 +2176,13 @@
               <a:buChar char=""/>
             </a:pPr>
             <a:r>
-              <a:rPr b="0" lang="en-US" sz="2000" spc="-1" strike="noStrike">
-                <a:solidFill>
-                  <a:srgbClr val="000000"/>
-                </a:solidFill>
-                <a:latin typeface="Neue Haas Grotesk Text Pro"/>
+              <a:rPr b="0" lang="en-GB" sz="2000" spc="-1" strike="noStrike">
+                <a:latin typeface="Arial"/>
               </a:rPr>
               <a:t>Seventh Outline Level</a:t>
             </a:r>
-            <a:endParaRPr b="0" lang="en-US" sz="2000" spc="-1" strike="noStrike">
-              <a:solidFill>
-                <a:srgbClr val="000000"/>
-              </a:solidFill>
-              <a:latin typeface="Neue Haas Grotesk Text Pro"/>
+            <a:endParaRPr b="0" lang="en-GB" sz="2000" spc="-1" strike="noStrike">
+              <a:latin typeface="Arial"/>
             </a:endParaRPr>
           </a:p>
         </p:txBody>
@@ -2492,14 +2233,14 @@
       </p:grpSpPr>
       <p:sp>
         <p:nvSpPr>
-          <p:cNvPr id="47" name="Rectangle 17"/>
+          <p:cNvPr id="44" name="Rectangle 17"/>
           <p:cNvSpPr/>
           <p:nvPr/>
         </p:nvSpPr>
         <p:spPr>
           <a:xfrm>
             <a:off x="0" y="0"/>
-            <a:ext cx="12191760" cy="6857640"/>
+            <a:ext cx="12191400" cy="6857280"/>
           </a:xfrm>
           <a:prstGeom prst="rect">
             <a:avLst/>
@@ -2528,7 +2269,7 @@
       </p:sp>
       <p:pic>
         <p:nvPicPr>
-          <p:cNvPr id="48" name="Picture 3" descr="A blue and white room with a blue sky&#10;&#10;AI-generated content may be incorrect."/>
+          <p:cNvPr id="45" name="Picture 3" descr="A blue and white room with a blue sky&#10;&#10;AI-generated content may be incorrect."/>
           <p:cNvPicPr/>
           <p:nvPr/>
         </p:nvPicPr>
@@ -2542,7 +2283,7 @@
         <p:spPr>
           <a:xfrm>
             <a:off x="0" y="0"/>
-            <a:ext cx="12191760" cy="6857640"/>
+            <a:ext cx="12191400" cy="6857280"/>
           </a:xfrm>
           <a:prstGeom prst="rect">
             <a:avLst/>
@@ -2554,7 +2295,7 @@
       </p:pic>
       <p:sp>
         <p:nvSpPr>
-          <p:cNvPr id="49" name="PlaceHolder 1"/>
+          <p:cNvPr id="46" name="PlaceHolder 1"/>
           <p:cNvSpPr>
             <a:spLocks noGrp="1"/>
           </p:cNvSpPr>
@@ -2565,18 +2306,18 @@
         <p:spPr>
           <a:xfrm>
             <a:off x="2301840" y="1482480"/>
-            <a:ext cx="7587720" cy="2235960"/>
-          </a:xfrm>
-          <a:prstGeom prst="rect">
-            <a:avLst/>
-          </a:prstGeom>
-          <a:noFill/>
-          <a:ln w="0">
-            <a:noFill/>
-          </a:ln>
-        </p:spPr>
-        <p:txBody>
-          <a:bodyPr anchor="b">
+            <a:ext cx="7587360" cy="2235600"/>
+          </a:xfrm>
+          <a:prstGeom prst="rect">
+            <a:avLst/>
+          </a:prstGeom>
+          <a:noFill/>
+          <a:ln w="0">
+            <a:noFill/>
+          </a:ln>
+        </p:spPr>
+        <p:txBody>
+          <a:bodyPr lIns="0" rIns="0" tIns="0" bIns="0" anchor="b">
             <a:normAutofit/>
           </a:bodyPr>
           <a:p>
@@ -2595,11 +2336,8 @@
               </a:rPr>
               <a:t>Aquasensor 2</a:t>
             </a:r>
-            <a:endParaRPr b="0" lang="en-US" sz="5400" spc="-1" strike="noStrike">
-              <a:solidFill>
-                <a:srgbClr val="000000"/>
-              </a:solidFill>
-              <a:latin typeface="Neue Haas Grotesk Text Pro"/>
+            <a:endParaRPr b="0" lang="en-GB" sz="5400" spc="-1" strike="noStrike">
+              <a:latin typeface="Arial"/>
             </a:endParaRPr>
           </a:p>
         </p:txBody>
@@ -2643,14 +2381,14 @@
       </p:grpSpPr>
       <p:sp>
         <p:nvSpPr>
-          <p:cNvPr id="50" name="Rectangle 17"/>
+          <p:cNvPr id="47" name="Rectangle 17"/>
           <p:cNvSpPr/>
           <p:nvPr/>
         </p:nvSpPr>
         <p:spPr>
           <a:xfrm>
             <a:off x="0" y="0"/>
-            <a:ext cx="12191760" cy="6857640"/>
+            <a:ext cx="12191400" cy="6857280"/>
           </a:xfrm>
           <a:prstGeom prst="rect">
             <a:avLst/>
@@ -2679,7 +2417,7 @@
       </p:sp>
       <p:pic>
         <p:nvPicPr>
-          <p:cNvPr id="51" name="Picture 3" descr="A blue and white room with a blue sky&#10;&#10;AI-generated content may be incorrect."/>
+          <p:cNvPr id="48" name="Picture 3" descr="A blue and white room with a blue sky&#10;&#10;AI-generated content may be incorrect."/>
           <p:cNvPicPr/>
           <p:nvPr/>
         </p:nvPicPr>
@@ -2693,7 +2431,7 @@
         <p:spPr>
           <a:xfrm>
             <a:off x="0" y="0"/>
-            <a:ext cx="12191760" cy="6857640"/>
+            <a:ext cx="12191400" cy="6857280"/>
           </a:xfrm>
           <a:prstGeom prst="rect">
             <a:avLst/>
@@ -2705,14 +2443,14 @@
       </p:pic>
       <p:sp>
         <p:nvSpPr>
-          <p:cNvPr id="52" name="TextBox 5"/>
+          <p:cNvPr id="49" name="TextBox 5"/>
           <p:cNvSpPr/>
           <p:nvPr/>
         </p:nvSpPr>
         <p:spPr>
           <a:xfrm>
             <a:off x="127800" y="511200"/>
-            <a:ext cx="11936160" cy="1247760"/>
+            <a:ext cx="11935800" cy="1247400"/>
           </a:xfrm>
           <a:prstGeom prst="rect">
             <a:avLst/>
@@ -2746,6 +2484,7 @@
                 </a:solidFill>
                 <a:uFillTx/>
                 <a:latin typeface="Neue Haas Grotesk Text Pro"/>
+                <a:ea typeface="DejaVu Sans"/>
               </a:rPr>
               <a:t>Team Roles:</a:t>
             </a:r>
@@ -2756,6 +2495,7 @@
                   <a:srgbClr val="ffffff"/>
                 </a:solidFill>
                 <a:latin typeface="Neue Haas Grotesk Text Pro"/>
+                <a:ea typeface="DejaVu Sans"/>
               </a:rPr>
               <a:t>Finn – Back-end development and Feature Development</a:t>
             </a:r>
@@ -2766,6 +2506,7 @@
                   <a:srgbClr val="ffffff"/>
                 </a:solidFill>
                 <a:latin typeface="Neue Haas Grotesk Text Pro"/>
+                <a:ea typeface="DejaVu Sans"/>
               </a:rPr>
               <a:t>Jake – Back-end integrator and Studio editor</a:t>
             </a:r>
@@ -2776,6 +2517,7 @@
                   <a:srgbClr val="ffffff"/>
                 </a:solidFill>
                 <a:latin typeface="Neue Haas Grotesk Text Pro"/>
+                <a:ea typeface="DejaVu Sans"/>
               </a:rPr>
               <a:t>Connor – Front end development</a:t>
             </a:r>
@@ -2786,6 +2528,7 @@
                   <a:srgbClr val="ffffff"/>
                 </a:solidFill>
                 <a:latin typeface="Neue Haas Grotesk Text Pro"/>
+                <a:ea typeface="DejaVu Sans"/>
               </a:rPr>
               <a:t>Charlie – Project Documentation, Testing, Odd-Jobs, Compliance checking</a:t>
             </a:r>
@@ -2797,14 +2540,14 @@
       </p:sp>
       <p:sp>
         <p:nvSpPr>
-          <p:cNvPr id="53" name="TextBox 6"/>
+          <p:cNvPr id="50" name="TextBox 6"/>
           <p:cNvSpPr/>
           <p:nvPr/>
         </p:nvSpPr>
         <p:spPr>
           <a:xfrm>
             <a:off x="6833520" y="394560"/>
-            <a:ext cx="5132160" cy="6788160"/>
+            <a:ext cx="5131800" cy="7277760"/>
           </a:xfrm>
           <a:prstGeom prst="rect">
             <a:avLst/>
@@ -2838,6 +2581,7 @@
                 </a:solidFill>
                 <a:uFillTx/>
                 <a:latin typeface="Neue Haas Grotesk Text Pro"/>
+                <a:ea typeface="DejaVu Sans"/>
               </a:rPr>
               <a:t>Tech stack and why we chose it.</a:t>
             </a:r>
@@ -2849,6 +2593,7 @@
                   <a:srgbClr val="ffffff"/>
                 </a:solidFill>
                 <a:latin typeface="Neue Haas Grotesk Text Pro"/>
+                <a:ea typeface="DejaVu Sans"/>
               </a:rPr>
               <a:t>-MQTT: Required from Aquasensor</a:t>
             </a:r>
@@ -2860,6 +2605,7 @@
                   <a:srgbClr val="ffffff"/>
                 </a:solidFill>
                 <a:latin typeface="Neue Haas Grotesk Text Pro"/>
+                <a:ea typeface="DejaVu Sans"/>
               </a:rPr>
               <a:t>-Streamer processor: We have MQTT data and need to move it to POSTGRES and so it was required. We picked python as the data velocity was still rather slow.</a:t>
             </a:r>
@@ -2871,6 +2617,7 @@
                   <a:srgbClr val="ffffff"/>
                 </a:solidFill>
                 <a:latin typeface="Neue Haas Grotesk Text Pro"/>
+                <a:ea typeface="DejaVu Sans"/>
               </a:rPr>
               <a:t>-POSTGRES: Because it has extensions for geospatial data, open source and very cheap to deploy and maintain. Is Scalable.</a:t>
             </a:r>
@@ -2882,6 +2629,7 @@
                   <a:srgbClr val="ffffff"/>
                 </a:solidFill>
                 <a:latin typeface="Neue Haas Grotesk Text Pro"/>
+                <a:ea typeface="DejaVu Sans"/>
               </a:rPr>
               <a:t>-Redis: Cache upstream responses, needed external KV store to allow backend to remain stateless.</a:t>
             </a:r>
@@ -2893,6 +2641,7 @@
                   <a:srgbClr val="ffffff"/>
                 </a:solidFill>
                 <a:latin typeface="Neue Haas Grotesk Text Pro"/>
+                <a:ea typeface="DejaVu Sans"/>
               </a:rPr>
               <a:t>-Front end: Went with vanilla HTML and CSS and we templated that with ginger since it has native support with our backend technologies.</a:t>
             </a:r>
@@ -2904,6 +2653,7 @@
                   <a:srgbClr val="ffffff"/>
                 </a:solidFill>
                 <a:latin typeface="Neue Haas Grotesk Text Pro"/>
+                <a:ea typeface="DejaVu Sans"/>
               </a:rPr>
               <a:t>-Backend: Fast API as it allows for persistent session data. Provides auto-documentation. Extensive industry backed validation system through pydantic</a:t>
             </a:r>
@@ -2915,6 +2665,7 @@
                   <a:srgbClr val="ffffff"/>
                 </a:solidFill>
                 <a:latin typeface="Neue Haas Grotesk Text Pro"/>
+                <a:ea typeface="DejaVu Sans"/>
               </a:rPr>
               <a:t>-Docker: We chose this as it gives us a standardised environment between production and development. </a:t>
             </a:r>
@@ -2926,6 +2677,7 @@
                   <a:srgbClr val="ffffff"/>
                 </a:solidFill>
                 <a:latin typeface="Neue Haas Grotesk Text Pro"/>
+                <a:ea typeface="DejaVu Sans"/>
               </a:rPr>
               <a:t>-UV: Dependency management because its lock file allows for reproducible builds.</a:t>
             </a:r>
@@ -2939,14 +2691,14 @@
       </p:sp>
       <p:sp>
         <p:nvSpPr>
-          <p:cNvPr id="54" name="TextBox 8"/>
+          <p:cNvPr id="51" name="TextBox 8"/>
           <p:cNvSpPr/>
           <p:nvPr/>
         </p:nvSpPr>
         <p:spPr>
           <a:xfrm>
             <a:off x="1160280" y="3210840"/>
-            <a:ext cx="5859720" cy="913320"/>
+            <a:ext cx="5859360" cy="912960"/>
           </a:xfrm>
           <a:prstGeom prst="rect">
             <a:avLst/>
@@ -2981,6 +2733,7 @@
                   <a:srgbClr val="ffffff"/>
                 </a:solidFill>
                 <a:latin typeface="Neue Haas Grotesk Text Pro"/>
+                <a:ea typeface="DejaVu Sans"/>
               </a:rPr>
               <a:t>ARCHITECTURE DRAWINGS GO HERE</a:t>
             </a:r>
@@ -2992,7 +2745,7 @@
       </p:sp>
       <p:pic>
         <p:nvPicPr>
-          <p:cNvPr id="55" name="" descr=""/>
+          <p:cNvPr id="52" name="" descr=""/>
           <p:cNvPicPr/>
           <p:nvPr/>
         </p:nvPicPr>
@@ -3003,7 +2756,7 @@
         <p:spPr>
           <a:xfrm>
             <a:off x="540000" y="1800000"/>
-            <a:ext cx="5580000" cy="4973040"/>
+            <a:ext cx="5579640" cy="4972680"/>
           </a:xfrm>
           <a:prstGeom prst="rect">
             <a:avLst/>
@@ -3052,14 +2805,14 @@
       </p:grpSpPr>
       <p:sp>
         <p:nvSpPr>
-          <p:cNvPr id="56" name="Rectangle 17"/>
+          <p:cNvPr id="53" name="Rectangle 17"/>
           <p:cNvSpPr/>
           <p:nvPr/>
         </p:nvSpPr>
         <p:spPr>
           <a:xfrm>
             <a:off x="0" y="0"/>
-            <a:ext cx="12191760" cy="6857640"/>
+            <a:ext cx="12191400" cy="6857280"/>
           </a:xfrm>
           <a:prstGeom prst="rect">
             <a:avLst/>
@@ -3088,7 +2841,7 @@
       </p:sp>
       <p:pic>
         <p:nvPicPr>
-          <p:cNvPr id="57" name="Picture 3" descr="A blue and white room with a blue sky&#10;&#10;AI-generated content may be incorrect."/>
+          <p:cNvPr id="54" name="Picture 3" descr="A blue and white room with a blue sky&#10;&#10;AI-generated content may be incorrect."/>
           <p:cNvPicPr/>
           <p:nvPr/>
         </p:nvPicPr>
@@ -3102,7 +2855,7 @@
         <p:spPr>
           <a:xfrm>
             <a:off x="0" y="0"/>
-            <a:ext cx="12191760" cy="6857640"/>
+            <a:ext cx="12191400" cy="6857280"/>
           </a:xfrm>
           <a:prstGeom prst="rect">
             <a:avLst/>
@@ -3114,14 +2867,14 @@
       </p:pic>
       <p:sp>
         <p:nvSpPr>
-          <p:cNvPr id="58" name="TextBox 9"/>
+          <p:cNvPr id="55" name="TextBox 9"/>
           <p:cNvSpPr/>
           <p:nvPr/>
         </p:nvSpPr>
         <p:spPr>
           <a:xfrm>
             <a:off x="334440" y="334440"/>
-            <a:ext cx="5220720" cy="364680"/>
+            <a:ext cx="5220360" cy="364320"/>
           </a:xfrm>
           <a:prstGeom prst="rect">
             <a:avLst/>
@@ -3155,6 +2908,7 @@
                 </a:solidFill>
                 <a:uFillTx/>
                 <a:latin typeface="Neue Haas Grotesk Text Pro"/>
+                <a:ea typeface="DejaVu Sans"/>
               </a:rPr>
               <a:t>What we would like to have done</a:t>
             </a:r>
@@ -3166,14 +2920,14 @@
       </p:sp>
       <p:sp>
         <p:nvSpPr>
-          <p:cNvPr id="59" name="TextBox 10"/>
+          <p:cNvPr id="56" name="TextBox 10"/>
           <p:cNvSpPr/>
           <p:nvPr/>
         </p:nvSpPr>
         <p:spPr>
           <a:xfrm>
             <a:off x="334440" y="924120"/>
-            <a:ext cx="11631240" cy="3138840"/>
+            <a:ext cx="11630880" cy="3078360"/>
           </a:xfrm>
           <a:prstGeom prst="rect">
             <a:avLst/>
@@ -3206,6 +2960,7 @@
                   <a:srgbClr val="ffffff"/>
                 </a:solidFill>
                 <a:latin typeface="Neue Haas Grotesk Text Pro"/>
+                <a:ea typeface="DejaVu Sans"/>
               </a:rPr>
               <a:t>If given more time we would have liked to implement a system to give warning when river data suddenly spiked in one direction or another as it could have indicated something wrong with the river. </a:t>
             </a:r>
@@ -3217,6 +2972,7 @@
                   <a:srgbClr val="ffffff"/>
                 </a:solidFill>
                 <a:latin typeface="Neue Haas Grotesk Text Pro"/>
+                <a:ea typeface="DejaVu Sans"/>
               </a:rPr>
               <a:t>We also would have perhaps gone for a more interesting and robust tech stack however given the time and scope of the task we went for a more streamlined approach to our tech stack.</a:t>
             </a:r>
@@ -3228,6 +2984,7 @@
                   <a:srgbClr val="ffffff"/>
                 </a:solidFill>
                 <a:latin typeface="Neue Haas Grotesk Text Pro"/>
+                <a:ea typeface="DejaVu Sans"/>
               </a:rPr>
               <a:t>Finally, we would have liked to have implemented a notification system alongside the warnings system to fully realise the websites mobile capabilities.</a:t>
             </a:r>
@@ -3237,6 +2994,266 @@
           </a:p>
         </p:txBody>
       </p:sp>
+    </p:spTree>
+  </p:cSld>
+  <mc:AlternateContent>
+    <mc:Choice Requires="p14">
+      <p:transition spd="slow" p14:dur="2000"/>
+    </mc:Choice>
+    <mc:Fallback>
+      <p:transition spd="slow"/>
+    </mc:Fallback>
+  </mc:AlternateContent>
+</p:sld>
+</file>
+
+<file path=ppt/slides/slide4.xml><?xml version="1.0" encoding="utf-8"?>
+<p:sld xmlns:a="http://schemas.openxmlformats.org/drawingml/2006/main" xmlns:p="http://schemas.openxmlformats.org/presentationml/2006/main" xmlns:r="http://schemas.openxmlformats.org/officeDocument/2006/relationships" xmlns:p14="http://schemas.microsoft.com/office/powerpoint/2010/main" xmlns:p15="http://schemas.microsoft.com/office/powerpoint/2012/main" xmlns:mc="http://schemas.openxmlformats.org/markup-compatibility/2006">
+  <p:cSld>
+    <p:spTree>
+      <p:nvGrpSpPr>
+        <p:cNvPr id="1" name=""/>
+        <p:cNvGrpSpPr/>
+        <p:nvPr/>
+      </p:nvGrpSpPr>
+      <p:grpSpPr>
+        <a:xfrm>
+          <a:off x="0" y="0"/>
+          <a:ext cx="0" cy="0"/>
+          <a:chOff x="0" y="0"/>
+          <a:chExt cx="0" cy="0"/>
+        </a:xfrm>
+      </p:grpSpPr>
+      <p:pic>
+        <p:nvPicPr>
+          <p:cNvPr id="57" name="" descr=""/>
+          <p:cNvPicPr/>
+          <p:nvPr/>
+        </p:nvPicPr>
+        <p:blipFill>
+          <a:blip r:embed="rId1"/>
+          <a:stretch/>
+        </p:blipFill>
+        <p:spPr>
+          <a:xfrm>
+            <a:off x="981360" y="643320"/>
+            <a:ext cx="10269000" cy="5600880"/>
+          </a:xfrm>
+          <a:prstGeom prst="rect">
+            <a:avLst/>
+          </a:prstGeom>
+          <a:ln w="0">
+            <a:noFill/>
+          </a:ln>
+        </p:spPr>
+      </p:pic>
+      <p:sp>
+        <p:nvSpPr>
+          <p:cNvPr id="58" name="PlaceHolder 1"/>
+          <p:cNvSpPr>
+            <a:spLocks noGrp="1"/>
+          </p:cNvSpPr>
+          <p:nvPr>
+            <p:ph type="subTitle"/>
+          </p:nvPr>
+        </p:nvSpPr>
+        <p:spPr>
+          <a:xfrm>
+            <a:off x="180000" y="497520"/>
+            <a:ext cx="3772440" cy="942480"/>
+          </a:xfrm>
+          <a:prstGeom prst="rect">
+            <a:avLst/>
+          </a:prstGeom>
+          <a:noFill/>
+          <a:ln w="0">
+            <a:noFill/>
+          </a:ln>
+        </p:spPr>
+        <p:txBody>
+          <a:bodyPr lIns="0" rIns="0" tIns="0" bIns="0" anchor="ctr">
+            <a:noAutofit/>
+          </a:bodyPr>
+          <a:p>
+            <a:pPr algn="ctr">
+              <a:buNone/>
+            </a:pPr>
+            <a:r>
+              <a:rPr b="0" lang="en-GB" sz="3200" spc="-1" strike="noStrike">
+                <a:latin typeface="Arial"/>
+              </a:rPr>
+              <a:t>ZAP Report</a:t>
+            </a:r>
+            <a:endParaRPr b="0" lang="en-GB" sz="3200" spc="-1" strike="noStrike">
+              <a:latin typeface="Arial"/>
+            </a:endParaRPr>
+          </a:p>
+        </p:txBody>
+      </p:sp>
+    </p:spTree>
+  </p:cSld>
+  <mc:AlternateContent>
+    <mc:Choice Requires="p14">
+      <p:transition spd="slow" p14:dur="2000"/>
+    </mc:Choice>
+    <mc:Fallback>
+      <p:transition spd="slow"/>
+    </mc:Fallback>
+  </mc:AlternateContent>
+</p:sld>
+</file>
+
+<file path=ppt/slides/slide5.xml><?xml version="1.0" encoding="utf-8"?>
+<p:sld xmlns:a="http://schemas.openxmlformats.org/drawingml/2006/main" xmlns:p="http://schemas.openxmlformats.org/presentationml/2006/main" xmlns:r="http://schemas.openxmlformats.org/officeDocument/2006/relationships" xmlns:p14="http://schemas.microsoft.com/office/powerpoint/2010/main" xmlns:p15="http://schemas.microsoft.com/office/powerpoint/2012/main" xmlns:mc="http://schemas.openxmlformats.org/markup-compatibility/2006">
+  <p:cSld>
+    <p:spTree>
+      <p:nvGrpSpPr>
+        <p:cNvPr id="1" name=""/>
+        <p:cNvGrpSpPr/>
+        <p:nvPr/>
+      </p:nvGrpSpPr>
+      <p:grpSpPr>
+        <a:xfrm>
+          <a:off x="0" y="0"/>
+          <a:ext cx="0" cy="0"/>
+          <a:chOff x="0" y="0"/>
+          <a:chExt cx="0" cy="0"/>
+        </a:xfrm>
+      </p:grpSpPr>
+      <p:sp>
+        <p:nvSpPr>
+          <p:cNvPr id="59" name="PlaceHolder 1"/>
+          <p:cNvSpPr>
+            <a:spLocks noGrp="1"/>
+          </p:cNvSpPr>
+          <p:nvPr>
+            <p:ph type="title"/>
+          </p:nvPr>
+        </p:nvSpPr>
+        <p:spPr>
+          <a:xfrm>
+            <a:off x="2301840" y="-540000"/>
+            <a:ext cx="7587360" cy="2620440"/>
+          </a:xfrm>
+          <a:prstGeom prst="rect">
+            <a:avLst/>
+          </a:prstGeom>
+          <a:noFill/>
+          <a:ln w="0">
+            <a:noFill/>
+          </a:ln>
+        </p:spPr>
+        <p:txBody>
+          <a:bodyPr lIns="0" rIns="0" tIns="0" bIns="0" anchor="ctr">
+            <a:noAutofit/>
+          </a:bodyPr>
+          <a:p>
+            <a:pPr algn="ctr">
+              <a:buNone/>
+            </a:pPr>
+            <a:r>
+              <a:rPr b="0" lang="en-GB" sz="4400" spc="-1" strike="noStrike">
+                <a:latin typeface="Arial"/>
+              </a:rPr>
+              <a:t>Github Code QL</a:t>
+            </a:r>
+            <a:endParaRPr b="0" lang="en-GB" sz="4400" spc="-1" strike="noStrike">
+              <a:latin typeface="Arial"/>
+            </a:endParaRPr>
+          </a:p>
+        </p:txBody>
+      </p:sp>
+      <p:sp>
+        <p:nvSpPr>
+          <p:cNvPr id="60" name="PlaceHolder 2"/>
+          <p:cNvSpPr>
+            <a:spLocks noGrp="1"/>
+          </p:cNvSpPr>
+          <p:nvPr>
+            <p:ph/>
+          </p:nvPr>
+        </p:nvSpPr>
+        <p:spPr>
+          <a:xfrm>
+            <a:off x="609480" y="1604520"/>
+            <a:ext cx="5354280" cy="3977280"/>
+          </a:xfrm>
+          <a:prstGeom prst="rect">
+            <a:avLst/>
+          </a:prstGeom>
+          <a:noFill/>
+          <a:ln w="0">
+            <a:noFill/>
+          </a:ln>
+        </p:spPr>
+        <p:txBody>
+          <a:bodyPr lIns="0" rIns="0" tIns="0" bIns="0" anchor="t">
+            <a:normAutofit/>
+          </a:bodyPr>
+          <a:p>
+            <a:endParaRPr b="0" lang="en-GB" sz="3200" spc="-1" strike="noStrike">
+              <a:latin typeface="Arial"/>
+            </a:endParaRPr>
+          </a:p>
+        </p:txBody>
+      </p:sp>
+      <p:sp>
+        <p:nvSpPr>
+          <p:cNvPr id="61" name="PlaceHolder 3"/>
+          <p:cNvSpPr>
+            <a:spLocks noGrp="1"/>
+          </p:cNvSpPr>
+          <p:nvPr>
+            <p:ph/>
+          </p:nvPr>
+        </p:nvSpPr>
+        <p:spPr>
+          <a:xfrm>
+            <a:off x="6231960" y="1604520"/>
+            <a:ext cx="5354280" cy="3977280"/>
+          </a:xfrm>
+          <a:prstGeom prst="rect">
+            <a:avLst/>
+          </a:prstGeom>
+          <a:noFill/>
+          <a:ln w="0">
+            <a:noFill/>
+          </a:ln>
+        </p:spPr>
+        <p:txBody>
+          <a:bodyPr lIns="0" rIns="0" tIns="0" bIns="0" anchor="t">
+            <a:normAutofit/>
+          </a:bodyPr>
+          <a:p>
+            <a:endParaRPr b="0" lang="en-GB" sz="3200" spc="-1" strike="noStrike">
+              <a:latin typeface="Arial"/>
+            </a:endParaRPr>
+          </a:p>
+        </p:txBody>
+      </p:sp>
+      <p:pic>
+        <p:nvPicPr>
+          <p:cNvPr id="62" name="" descr=""/>
+          <p:cNvPicPr/>
+          <p:nvPr/>
+        </p:nvPicPr>
+        <p:blipFill>
+          <a:blip r:embed="rId1"/>
+          <a:stretch/>
+        </p:blipFill>
+        <p:spPr>
+          <a:xfrm>
+            <a:off x="505080" y="385920"/>
+            <a:ext cx="11221560" cy="6115320"/>
+          </a:xfrm>
+          <a:prstGeom prst="rect">
+            <a:avLst/>
+          </a:prstGeom>
+          <a:ln w="0">
+            <a:noFill/>
+          </a:ln>
+        </p:spPr>
+      </p:pic>
     </p:spTree>
   </p:cSld>
   <mc:AlternateContent>

</xml_diff>